<commit_message>
analises finais - 270224
</commit_message>
<xml_diff>
--- a/dag.pptx
+++ b/dag.pptx
@@ -116,7 +116,7 @@
 <file path=ppt/revisionInfo.xml><?xml version="1.0" encoding="utf-8"?>
 <p1510:revInfo xmlns:a="http://schemas.openxmlformats.org/drawingml/2006/main" xmlns:r="http://schemas.openxmlformats.org/officeDocument/2006/relationships" xmlns:p1510="http://schemas.microsoft.com/office/powerpoint/2015/10/main">
   <p1510:revLst>
-    <p1510:client id="{8AB19827-143E-452B-B4BC-E51D6C9875C0}" v="9" dt="2024-02-24T21:35:26.222"/>
+    <p1510:client id="{8AB19827-143E-452B-B4BC-E51D6C9875C0}" v="16" dt="2024-02-27T17:21:47.267"/>
   </p1510:revLst>
 </p1510:revInfo>
 </file>
@@ -126,16 +126,72 @@
   <pc:docChgLst>
     <pc:chgData name="Saulo Gil" userId="e4b858b1fb629067" providerId="LiveId" clId="{8AB19827-143E-452B-B4BC-E51D6C9875C0}"/>
     <pc:docChg chg="undo custSel addSld modSld">
-      <pc:chgData name="Saulo Gil" userId="e4b858b1fb629067" providerId="LiveId" clId="{8AB19827-143E-452B-B4BC-E51D6C9875C0}" dt="2024-02-24T21:35:27.757" v="249" actId="21"/>
+      <pc:chgData name="Saulo Gil" userId="e4b858b1fb629067" providerId="LiveId" clId="{8AB19827-143E-452B-B4BC-E51D6C9875C0}" dt="2024-02-27T17:21:48.547" v="307" actId="21"/>
       <pc:docMkLst>
         <pc:docMk/>
       </pc:docMkLst>
-      <pc:sldChg chg="addSp delSp mod">
-        <pc:chgData name="Saulo Gil" userId="e4b858b1fb629067" providerId="LiveId" clId="{8AB19827-143E-452B-B4BC-E51D6C9875C0}" dt="2024-02-24T20:35:37.066" v="1" actId="21"/>
+      <pc:sldChg chg="addSp delSp modSp mod">
+        <pc:chgData name="Saulo Gil" userId="e4b858b1fb629067" providerId="LiveId" clId="{8AB19827-143E-452B-B4BC-E51D6C9875C0}" dt="2024-02-27T17:21:48.547" v="307" actId="21"/>
         <pc:sldMkLst>
           <pc:docMk/>
           <pc:sldMk cId="2155532498" sldId="256"/>
         </pc:sldMkLst>
+        <pc:spChg chg="mod">
+          <ac:chgData name="Saulo Gil" userId="e4b858b1fb629067" providerId="LiveId" clId="{8AB19827-143E-452B-B4BC-E51D6C9875C0}" dt="2024-02-27T17:21:11.024" v="298" actId="14100"/>
+          <ac:spMkLst>
+            <pc:docMk/>
+            <pc:sldMk cId="2155532498" sldId="256"/>
+            <ac:spMk id="6" creationId="{2A851C23-A474-A49A-8423-C7F6CC0BC8AE}"/>
+          </ac:spMkLst>
+        </pc:spChg>
+        <pc:spChg chg="mod">
+          <ac:chgData name="Saulo Gil" userId="e4b858b1fb629067" providerId="LiveId" clId="{8AB19827-143E-452B-B4BC-E51D6C9875C0}" dt="2024-02-27T17:21:34.313" v="305" actId="1035"/>
+          <ac:spMkLst>
+            <pc:docMk/>
+            <pc:sldMk cId="2155532498" sldId="256"/>
+            <ac:spMk id="7" creationId="{148D0B84-0B4F-E1FC-F965-AFADA09F8713}"/>
+          </ac:spMkLst>
+        </pc:spChg>
+        <pc:spChg chg="mod">
+          <ac:chgData name="Saulo Gil" userId="e4b858b1fb629067" providerId="LiveId" clId="{8AB19827-143E-452B-B4BC-E51D6C9875C0}" dt="2024-02-27T17:21:03.185" v="297" actId="1035"/>
+          <ac:spMkLst>
+            <pc:docMk/>
+            <pc:sldMk cId="2155532498" sldId="256"/>
+            <ac:spMk id="8" creationId="{CEA8E330-F5D9-EEDA-F14D-837A45090982}"/>
+          </ac:spMkLst>
+        </pc:spChg>
+        <pc:spChg chg="mod">
+          <ac:chgData name="Saulo Gil" userId="e4b858b1fb629067" providerId="LiveId" clId="{8AB19827-143E-452B-B4BC-E51D6C9875C0}" dt="2024-02-27T17:21:29.649" v="302" actId="1076"/>
+          <ac:spMkLst>
+            <pc:docMk/>
+            <pc:sldMk cId="2155532498" sldId="256"/>
+            <ac:spMk id="9" creationId="{8298A1D5-52E2-2F99-DFD5-EE4BF3C1AEEA}"/>
+          </ac:spMkLst>
+        </pc:spChg>
+        <pc:picChg chg="add mod ord modCrop">
+          <ac:chgData name="Saulo Gil" userId="e4b858b1fb629067" providerId="LiveId" clId="{8AB19827-143E-452B-B4BC-E51D6C9875C0}" dt="2024-02-27T17:21:16.671" v="300" actId="1076"/>
+          <ac:picMkLst>
+            <pc:docMk/>
+            <pc:sldMk cId="2155532498" sldId="256"/>
+            <ac:picMk id="3" creationId="{0C32E604-86AE-CDE7-FEBA-84D9E749F258}"/>
+          </ac:picMkLst>
+        </pc:picChg>
+        <pc:picChg chg="add del">
+          <ac:chgData name="Saulo Gil" userId="e4b858b1fb629067" providerId="LiveId" clId="{8AB19827-143E-452B-B4BC-E51D6C9875C0}" dt="2024-02-27T17:21:48.547" v="307" actId="21"/>
+          <ac:picMkLst>
+            <pc:docMk/>
+            <pc:sldMk cId="2155532498" sldId="256"/>
+            <ac:picMk id="4" creationId="{2B5B15E8-E6D0-2FF2-54E1-13E9A127F628}"/>
+          </ac:picMkLst>
+        </pc:picChg>
+        <pc:picChg chg="del">
+          <ac:chgData name="Saulo Gil" userId="e4b858b1fb629067" providerId="LiveId" clId="{8AB19827-143E-452B-B4BC-E51D6C9875C0}" dt="2024-02-27T17:20:28.675" v="269" actId="478"/>
+          <ac:picMkLst>
+            <pc:docMk/>
+            <pc:sldMk cId="2155532498" sldId="256"/>
+            <ac:picMk id="5" creationId="{3496F38B-31B6-DAA4-863E-5CA5B1C18473}"/>
+          </ac:picMkLst>
+        </pc:picChg>
         <pc:picChg chg="add del">
           <ac:chgData name="Saulo Gil" userId="e4b858b1fb629067" providerId="LiveId" clId="{8AB19827-143E-452B-B4BC-E51D6C9875C0}" dt="2024-02-24T20:35:37.066" v="1" actId="21"/>
           <ac:picMkLst>
@@ -146,7 +202,7 @@
         </pc:picChg>
       </pc:sldChg>
       <pc:sldChg chg="addSp delSp modSp new mod">
-        <pc:chgData name="Saulo Gil" userId="e4b858b1fb629067" providerId="LiveId" clId="{8AB19827-143E-452B-B4BC-E51D6C9875C0}" dt="2024-02-24T21:35:27.757" v="249" actId="21"/>
+        <pc:chgData name="Saulo Gil" userId="e4b858b1fb629067" providerId="LiveId" clId="{8AB19827-143E-452B-B4BC-E51D6C9875C0}" dt="2024-02-27T17:10:25.061" v="268" actId="21"/>
         <pc:sldMkLst>
           <pc:docMk/>
           <pc:sldMk cId="1450547401" sldId="257"/>
@@ -168,7 +224,7 @@
           </ac:spMkLst>
         </pc:spChg>
         <pc:spChg chg="add mod">
-          <ac:chgData name="Saulo Gil" userId="e4b858b1fb629067" providerId="LiveId" clId="{8AB19827-143E-452B-B4BC-E51D6C9875C0}" dt="2024-02-24T21:34:46.949" v="180" actId="1035"/>
+          <ac:chgData name="Saulo Gil" userId="e4b858b1fb629067" providerId="LiveId" clId="{8AB19827-143E-452B-B4BC-E51D6C9875C0}" dt="2024-02-27T17:06:09.419" v="251" actId="20577"/>
           <ac:spMkLst>
             <pc:docMk/>
             <pc:sldMk cId="1450547401" sldId="257"/>
@@ -183,12 +239,28 @@
             <ac:spMk id="10" creationId="{A0D11A46-BE15-9D9A-ED95-07007B10BC27}"/>
           </ac:spMkLst>
         </pc:spChg>
-        <pc:picChg chg="add mod">
-          <ac:chgData name="Saulo Gil" userId="e4b858b1fb629067" providerId="LiveId" clId="{8AB19827-143E-452B-B4BC-E51D6C9875C0}" dt="2024-02-24T21:34:14.623" v="85" actId="1076"/>
+        <pc:picChg chg="add del mod">
+          <ac:chgData name="Saulo Gil" userId="e4b858b1fb629067" providerId="LiveId" clId="{8AB19827-143E-452B-B4BC-E51D6C9875C0}" dt="2024-02-27T17:07:07.340" v="253" actId="21"/>
+          <ac:picMkLst>
+            <pc:docMk/>
+            <pc:sldMk cId="1450547401" sldId="257"/>
+            <ac:picMk id="2" creationId="{13B2A85A-6D30-04E2-A9AD-410BB80C8195}"/>
+          </ac:picMkLst>
+        </pc:picChg>
+        <pc:picChg chg="add del mod">
+          <ac:chgData name="Saulo Gil" userId="e4b858b1fb629067" providerId="LiveId" clId="{8AB19827-143E-452B-B4BC-E51D6C9875C0}" dt="2024-02-27T17:08:01.707" v="256" actId="478"/>
           <ac:picMkLst>
             <pc:docMk/>
             <pc:sldMk cId="1450547401" sldId="257"/>
             <ac:picMk id="3" creationId="{59940E6A-2D3F-58C0-95B6-60E74CAE3B50}"/>
+          </ac:picMkLst>
+        </pc:picChg>
+        <pc:picChg chg="add del">
+          <ac:chgData name="Saulo Gil" userId="e4b858b1fb629067" providerId="LiveId" clId="{8AB19827-143E-452B-B4BC-E51D6C9875C0}" dt="2024-02-27T17:08:00.296" v="255" actId="478"/>
+          <ac:picMkLst>
+            <pc:docMk/>
+            <pc:sldMk cId="1450547401" sldId="257"/>
+            <ac:picMk id="4" creationId="{C99EA967-B5BD-9268-1518-D3BC600B6E24}"/>
           </ac:picMkLst>
         </pc:picChg>
         <pc:picChg chg="add del mod">
@@ -197,6 +269,22 @@
             <pc:docMk/>
             <pc:sldMk cId="1450547401" sldId="257"/>
             <ac:picMk id="11" creationId="{A1BA6198-9D41-207C-5AC1-51D7121F887E}"/>
+          </ac:picMkLst>
+        </pc:picChg>
+        <pc:picChg chg="add mod ord">
+          <ac:chgData name="Saulo Gil" userId="e4b858b1fb629067" providerId="LiveId" clId="{8AB19827-143E-452B-B4BC-E51D6C9875C0}" dt="2024-02-27T17:10:18.924" v="266"/>
+          <ac:picMkLst>
+            <pc:docMk/>
+            <pc:sldMk cId="1450547401" sldId="257"/>
+            <ac:picMk id="11" creationId="{F2895583-C7AD-E6C7-3D71-26D23EBBF9D8}"/>
+          </ac:picMkLst>
+        </pc:picChg>
+        <pc:picChg chg="add del mod">
+          <ac:chgData name="Saulo Gil" userId="e4b858b1fb629067" providerId="LiveId" clId="{8AB19827-143E-452B-B4BC-E51D6C9875C0}" dt="2024-02-27T17:10:25.061" v="268" actId="21"/>
+          <ac:picMkLst>
+            <pc:docMk/>
+            <pc:sldMk cId="1450547401" sldId="257"/>
+            <ac:picMk id="12" creationId="{108AEB19-C32A-FB45-DE20-83B7A459AF09}"/>
           </ac:picMkLst>
         </pc:picChg>
         <pc:cxnChg chg="add mod">
@@ -376,7 +464,7 @@
           <a:p>
             <a:fld id="{3172DAF1-1AC2-43E0-9170-252A238D4D21}" type="datetimeFigureOut">
               <a:rPr lang="pt-BR" smtClean="0"/>
-              <a:t>24/02/2024</a:t>
+              <a:t>27/02/2024</a:t>
             </a:fld>
             <a:endParaRPr lang="pt-BR"/>
           </a:p>
@@ -574,7 +662,7 @@
           <a:p>
             <a:fld id="{3172DAF1-1AC2-43E0-9170-252A238D4D21}" type="datetimeFigureOut">
               <a:rPr lang="pt-BR" smtClean="0"/>
-              <a:t>24/02/2024</a:t>
+              <a:t>27/02/2024</a:t>
             </a:fld>
             <a:endParaRPr lang="pt-BR"/>
           </a:p>
@@ -782,7 +870,7 @@
           <a:p>
             <a:fld id="{3172DAF1-1AC2-43E0-9170-252A238D4D21}" type="datetimeFigureOut">
               <a:rPr lang="pt-BR" smtClean="0"/>
-              <a:t>24/02/2024</a:t>
+              <a:t>27/02/2024</a:t>
             </a:fld>
             <a:endParaRPr lang="pt-BR"/>
           </a:p>
@@ -980,7 +1068,7 @@
           <a:p>
             <a:fld id="{3172DAF1-1AC2-43E0-9170-252A238D4D21}" type="datetimeFigureOut">
               <a:rPr lang="pt-BR" smtClean="0"/>
-              <a:t>24/02/2024</a:t>
+              <a:t>27/02/2024</a:t>
             </a:fld>
             <a:endParaRPr lang="pt-BR"/>
           </a:p>
@@ -1255,7 +1343,7 @@
           <a:p>
             <a:fld id="{3172DAF1-1AC2-43E0-9170-252A238D4D21}" type="datetimeFigureOut">
               <a:rPr lang="pt-BR" smtClean="0"/>
-              <a:t>24/02/2024</a:t>
+              <a:t>27/02/2024</a:t>
             </a:fld>
             <a:endParaRPr lang="pt-BR"/>
           </a:p>
@@ -1520,7 +1608,7 @@
           <a:p>
             <a:fld id="{3172DAF1-1AC2-43E0-9170-252A238D4D21}" type="datetimeFigureOut">
               <a:rPr lang="pt-BR" smtClean="0"/>
-              <a:t>24/02/2024</a:t>
+              <a:t>27/02/2024</a:t>
             </a:fld>
             <a:endParaRPr lang="pt-BR"/>
           </a:p>
@@ -1932,7 +2020,7 @@
           <a:p>
             <a:fld id="{3172DAF1-1AC2-43E0-9170-252A238D4D21}" type="datetimeFigureOut">
               <a:rPr lang="pt-BR" smtClean="0"/>
-              <a:t>24/02/2024</a:t>
+              <a:t>27/02/2024</a:t>
             </a:fld>
             <a:endParaRPr lang="pt-BR"/>
           </a:p>
@@ -2073,7 +2161,7 @@
           <a:p>
             <a:fld id="{3172DAF1-1AC2-43E0-9170-252A238D4D21}" type="datetimeFigureOut">
               <a:rPr lang="pt-BR" smtClean="0"/>
-              <a:t>24/02/2024</a:t>
+              <a:t>27/02/2024</a:t>
             </a:fld>
             <a:endParaRPr lang="pt-BR"/>
           </a:p>
@@ -2186,7 +2274,7 @@
           <a:p>
             <a:fld id="{3172DAF1-1AC2-43E0-9170-252A238D4D21}" type="datetimeFigureOut">
               <a:rPr lang="pt-BR" smtClean="0"/>
-              <a:t>24/02/2024</a:t>
+              <a:t>27/02/2024</a:t>
             </a:fld>
             <a:endParaRPr lang="pt-BR"/>
           </a:p>
@@ -2497,7 +2585,7 @@
           <a:p>
             <a:fld id="{3172DAF1-1AC2-43E0-9170-252A238D4D21}" type="datetimeFigureOut">
               <a:rPr lang="pt-BR" smtClean="0"/>
-              <a:t>24/02/2024</a:t>
+              <a:t>27/02/2024</a:t>
             </a:fld>
             <a:endParaRPr lang="pt-BR"/>
           </a:p>
@@ -2785,7 +2873,7 @@
           <a:p>
             <a:fld id="{3172DAF1-1AC2-43E0-9170-252A238D4D21}" type="datetimeFigureOut">
               <a:rPr lang="pt-BR" smtClean="0"/>
-              <a:t>24/02/2024</a:t>
+              <a:t>27/02/2024</a:t>
             </a:fld>
             <a:endParaRPr lang="pt-BR"/>
           </a:p>
@@ -3026,7 +3114,7 @@
           <a:p>
             <a:fld id="{3172DAF1-1AC2-43E0-9170-252A238D4D21}" type="datetimeFigureOut">
               <a:rPr lang="pt-BR" smtClean="0"/>
-              <a:t>24/02/2024</a:t>
+              <a:t>27/02/2024</a:t>
             </a:fld>
             <a:endParaRPr lang="pt-BR"/>
           </a:p>
@@ -3445,10 +3533,10 @@
       </p:grpSpPr>
       <p:pic>
         <p:nvPicPr>
-          <p:cNvPr id="5" name="Imagem 4" descr="Diagrama&#10;&#10;Descrição gerada automaticamente">
-            <a:extLst>
-              <a:ext uri="{FF2B5EF4-FFF2-40B4-BE49-F238E27FC236}">
-                <a16:creationId xmlns:a16="http://schemas.microsoft.com/office/drawing/2014/main" id="{3496F38B-31B6-DAA4-863E-5CA5B1C18473}"/>
+          <p:cNvPr id="3" name="Imagem 2" descr="Gráfico, Diagrama&#10;&#10;Descrição gerada automaticamente">
+            <a:extLst>
+              <a:ext uri="{FF2B5EF4-FFF2-40B4-BE49-F238E27FC236}">
+                <a16:creationId xmlns:a16="http://schemas.microsoft.com/office/drawing/2014/main" id="{0C32E604-86AE-CDE7-FEBA-84D9E749F258}"/>
               </a:ext>
             </a:extLst>
           </p:cNvPr>
@@ -3465,13 +3553,13 @@
               </a:ext>
             </a:extLst>
           </a:blip>
-          <a:srcRect b="39209"/>
+          <a:srcRect b="42857"/>
           <a:stretch/>
         </p:blipFill>
         <p:spPr>
           <a:xfrm>
-            <a:off x="1567723" y="278968"/>
-            <a:ext cx="8724758" cy="5951349"/>
+            <a:off x="1341913" y="106878"/>
+            <a:ext cx="10731510" cy="6749426"/>
           </a:xfrm>
           <a:prstGeom prst="rect">
             <a:avLst/>
@@ -3492,8 +3580,8 @@
         </p:nvSpPr>
         <p:spPr>
           <a:xfrm>
-            <a:off x="4465122" y="534390"/>
-            <a:ext cx="5403273" cy="748145"/>
+            <a:off x="4465122" y="502422"/>
+            <a:ext cx="7445829" cy="791988"/>
           </a:xfrm>
           <a:prstGeom prst="roundRect">
             <a:avLst/>
@@ -3545,8 +3633,8 @@
         </p:nvSpPr>
         <p:spPr>
           <a:xfrm flipH="1" flipV="1">
-            <a:off x="4334493" y="4548247"/>
-            <a:ext cx="771896" cy="1567543"/>
+            <a:off x="5474524" y="4893867"/>
+            <a:ext cx="771896" cy="1938686"/>
           </a:xfrm>
           <a:prstGeom prst="roundRect">
             <a:avLst/>
@@ -3598,8 +3686,8 @@
         </p:nvSpPr>
         <p:spPr>
           <a:xfrm>
-            <a:off x="4465122" y="289645"/>
-            <a:ext cx="5403273" cy="307777"/>
+            <a:off x="4465122" y="194645"/>
+            <a:ext cx="7445829" cy="307777"/>
           </a:xfrm>
           <a:prstGeom prst="rect">
             <a:avLst/>
@@ -3640,7 +3728,7 @@
         </p:nvSpPr>
         <p:spPr>
           <a:xfrm>
-            <a:off x="4025732" y="6051480"/>
+            <a:off x="5136077" y="6751122"/>
             <a:ext cx="1448790" cy="523220"/>
           </a:xfrm>
           <a:prstGeom prst="rect">
@@ -3743,10 +3831,10 @@
       </p:grpSpPr>
       <p:pic>
         <p:nvPicPr>
-          <p:cNvPr id="3" name="Imagem 2">
-            <a:extLst>
-              <a:ext uri="{FF2B5EF4-FFF2-40B4-BE49-F238E27FC236}">
-                <a16:creationId xmlns:a16="http://schemas.microsoft.com/office/drawing/2014/main" id="{59940E6A-2D3F-58C0-95B6-60E74CAE3B50}"/>
+          <p:cNvPr id="11" name="Imagem 10">
+            <a:extLst>
+              <a:ext uri="{FF2B5EF4-FFF2-40B4-BE49-F238E27FC236}">
+                <a16:creationId xmlns:a16="http://schemas.microsoft.com/office/drawing/2014/main" id="{F2895583-C7AD-E6C7-3D71-26D23EBBF9D8}"/>
               </a:ext>
             </a:extLst>
           </p:cNvPr>
@@ -3775,8 +3863,8 @@
         </p:blipFill>
         <p:spPr>
           <a:xfrm>
-            <a:off x="3433680" y="0"/>
-            <a:ext cx="5324639" cy="6858000"/>
+            <a:off x="3326646" y="0"/>
+            <a:ext cx="5538707" cy="6858000"/>
           </a:xfrm>
           <a:prstGeom prst="rect">
             <a:avLst/>
@@ -3930,7 +4018,7 @@
                 <a:latin typeface="Times New Roman" panose="02020603050405020304" pitchFamily="18" charset="0"/>
                 <a:cs typeface="Times New Roman" panose="02020603050405020304" pitchFamily="18" charset="0"/>
               </a:rPr>
-              <a:t>P&lt;0.0023</a:t>
+              <a:t>P=0.0023</a:t>
             </a:r>
           </a:p>
         </p:txBody>

</xml_diff>